<commit_message>
Fixing CSJ Bhajan Template
</commit_message>
<xml_diff>
--- a/WebContent/WEB-INF/templates/25th Anniversary/closingPrayers.pptx
+++ b/WebContent/WEB-INF/templates/25th Anniversary/closingPrayers.pptx
@@ -211,7 +211,7 @@
           <a:p>
             <a:fld id="{B4297479-840D-294F-9C08-55F5B586E708}" type="datetimeFigureOut">
               <a:rPr lang="en-US" smtClean="0"/>
-              <a:t>3/18/17</a:t>
+              <a:t>5/13/17</a:t>
             </a:fld>
             <a:endParaRPr lang="en-US"/>
           </a:p>
@@ -479,6 +479,95 @@
 </p:notesMaster>
 </file>
 
+<file path=ppt/notesSlides/notesSlide1.xml><?xml version="1.0" encoding="utf-8"?>
+<p:notes xmlns:a="http://schemas.openxmlformats.org/drawingml/2006/main" xmlns:r="http://schemas.openxmlformats.org/officeDocument/2006/relationships" xmlns:p="http://schemas.openxmlformats.org/presentationml/2006/main">
+  <p:cSld>
+    <p:spTree>
+      <p:nvGrpSpPr>
+        <p:cNvPr id="1" name=""/>
+        <p:cNvGrpSpPr/>
+        <p:nvPr/>
+      </p:nvGrpSpPr>
+      <p:grpSpPr>
+        <a:xfrm>
+          <a:off x="0" y="0"/>
+          <a:ext cx="0" cy="0"/>
+          <a:chOff x="0" y="0"/>
+          <a:chExt cx="0" cy="0"/>
+        </a:xfrm>
+      </p:grpSpPr>
+      <p:sp>
+        <p:nvSpPr>
+          <p:cNvPr id="2" name="Slide Image Placeholder 1"/>
+          <p:cNvSpPr>
+            <a:spLocks noGrp="1" noRot="1" noChangeAspect="1"/>
+          </p:cNvSpPr>
+          <p:nvPr>
+            <p:ph type="sldImg"/>
+          </p:nvPr>
+        </p:nvSpPr>
+        <p:spPr>
+          <a:xfrm>
+            <a:off x="1143000" y="685800"/>
+            <a:ext cx="4572000" cy="3429000"/>
+          </a:xfrm>
+        </p:spPr>
+      </p:sp>
+      <p:sp>
+        <p:nvSpPr>
+          <p:cNvPr id="3" name="Notes Placeholder 2"/>
+          <p:cNvSpPr>
+            <a:spLocks noGrp="1"/>
+          </p:cNvSpPr>
+          <p:nvPr>
+            <p:ph type="body" idx="1"/>
+          </p:nvPr>
+        </p:nvSpPr>
+        <p:spPr/>
+        <p:txBody>
+          <a:bodyPr/>
+          <a:lstStyle/>
+          <a:p>
+            <a:endParaRPr lang="en-US" dirty="0"/>
+          </a:p>
+        </p:txBody>
+      </p:sp>
+      <p:sp>
+        <p:nvSpPr>
+          <p:cNvPr id="4" name="Slide Number Placeholder 3"/>
+          <p:cNvSpPr>
+            <a:spLocks noGrp="1"/>
+          </p:cNvSpPr>
+          <p:nvPr>
+            <p:ph type="sldNum" sz="quarter" idx="10"/>
+          </p:nvPr>
+        </p:nvSpPr>
+        <p:spPr/>
+        <p:txBody>
+          <a:bodyPr/>
+          <a:lstStyle/>
+          <a:p>
+            <a:fld id="{8CD7A9F0-93EA-7C44-B431-8E0B63C53BF7}" type="slidenum">
+              <a:rPr lang="en-US" smtClean="0"/>
+              <a:t>4</a:t>
+            </a:fld>
+            <a:endParaRPr lang="en-US"/>
+          </a:p>
+        </p:txBody>
+      </p:sp>
+    </p:spTree>
+    <p:extLst>
+      <p:ext uri="{BB962C8B-B14F-4D97-AF65-F5344CB8AC3E}">
+        <p14:creationId xmlns:p14="http://schemas.microsoft.com/office/powerpoint/2010/main" val="1149158476"/>
+      </p:ext>
+    </p:extLst>
+  </p:cSld>
+  <p:clrMapOvr>
+    <a:masterClrMapping/>
+  </p:clrMapOvr>
+</p:notes>
+</file>
+
 <file path=ppt/slideLayouts/slideLayout1.xml><?xml version="1.0" encoding="utf-8"?>
 <p:sldLayout xmlns:a="http://schemas.openxmlformats.org/drawingml/2006/main" xmlns:r="http://schemas.openxmlformats.org/officeDocument/2006/relationships" xmlns:p="http://schemas.openxmlformats.org/presentationml/2006/main" type="title" preserve="1">
   <p:cSld name="Title Slide">
@@ -508,7 +597,7 @@
         </p:nvSpPr>
         <p:spPr>
           <a:xfrm>
-            <a:off x="685800" y="2130428"/>
+            <a:off x="685800" y="2130429"/>
             <a:ext cx="7772400" cy="1470025"/>
           </a:xfrm>
         </p:spPr>
@@ -660,7 +749,7 @@
           <a:p>
             <a:fld id="{30F42486-D2A3-2447-A496-D33DD53C7227}" type="datetimeFigureOut">
               <a:rPr lang="en-US" smtClean="0"/>
-              <a:t>3/18/17</a:t>
+              <a:t>5/13/17</a:t>
             </a:fld>
             <a:endParaRPr lang="en-US"/>
           </a:p>
@@ -830,7 +919,7 @@
           <a:p>
             <a:fld id="{30F42486-D2A3-2447-A496-D33DD53C7227}" type="datetimeFigureOut">
               <a:rPr lang="en-US" smtClean="0"/>
-              <a:t>3/18/17</a:t>
+              <a:t>5/13/17</a:t>
             </a:fld>
             <a:endParaRPr lang="en-US"/>
           </a:p>
@@ -1010,7 +1099,7 @@
           <a:p>
             <a:fld id="{30F42486-D2A3-2447-A496-D33DD53C7227}" type="datetimeFigureOut">
               <a:rPr lang="en-US" smtClean="0"/>
-              <a:t>3/18/17</a:t>
+              <a:t>5/13/17</a:t>
             </a:fld>
             <a:endParaRPr lang="en-US"/>
           </a:p>
@@ -1180,7 +1269,7 @@
           <a:p>
             <a:fld id="{30F42486-D2A3-2447-A496-D33DD53C7227}" type="datetimeFigureOut">
               <a:rPr lang="en-US" smtClean="0"/>
-              <a:t>3/18/17</a:t>
+              <a:t>5/13/17</a:t>
             </a:fld>
             <a:endParaRPr lang="en-US"/>
           </a:p>
@@ -1426,7 +1515,7 @@
           <a:p>
             <a:fld id="{30F42486-D2A3-2447-A496-D33DD53C7227}" type="datetimeFigureOut">
               <a:rPr lang="en-US" smtClean="0"/>
-              <a:t>3/18/17</a:t>
+              <a:t>5/13/17</a:t>
             </a:fld>
             <a:endParaRPr lang="en-US"/>
           </a:p>
@@ -1714,7 +1803,7 @@
           <a:p>
             <a:fld id="{30F42486-D2A3-2447-A496-D33DD53C7227}" type="datetimeFigureOut">
               <a:rPr lang="en-US" smtClean="0"/>
-              <a:t>3/18/17</a:t>
+              <a:t>5/13/17</a:t>
             </a:fld>
             <a:endParaRPr lang="en-US"/>
           </a:p>
@@ -1981,7 +2070,7 @@
         </p:nvSpPr>
         <p:spPr>
           <a:xfrm>
-            <a:off x="4645029" y="1535113"/>
+            <a:off x="4645031" y="1535113"/>
             <a:ext cx="4041775" cy="639763"/>
           </a:xfrm>
         </p:spPr>
@@ -2046,7 +2135,7 @@
         </p:nvSpPr>
         <p:spPr>
           <a:xfrm>
-            <a:off x="4645029" y="2174875"/>
+            <a:off x="4645031" y="2174875"/>
             <a:ext cx="4041775" cy="3951288"/>
           </a:xfrm>
         </p:spPr>
@@ -2136,7 +2225,7 @@
           <a:p>
             <a:fld id="{30F42486-D2A3-2447-A496-D33DD53C7227}" type="datetimeFigureOut">
               <a:rPr lang="en-US" smtClean="0"/>
-              <a:t>3/18/17</a:t>
+              <a:t>5/13/17</a:t>
             </a:fld>
             <a:endParaRPr lang="en-US"/>
           </a:p>
@@ -2254,7 +2343,7 @@
           <a:p>
             <a:fld id="{30F42486-D2A3-2447-A496-D33DD53C7227}" type="datetimeFigureOut">
               <a:rPr lang="en-US" smtClean="0"/>
-              <a:t>3/18/17</a:t>
+              <a:t>5/13/17</a:t>
             </a:fld>
             <a:endParaRPr lang="en-US"/>
           </a:p>
@@ -2349,7 +2438,7 @@
           <a:p>
             <a:fld id="{30F42486-D2A3-2447-A496-D33DD53C7227}" type="datetimeFigureOut">
               <a:rPr lang="en-US" smtClean="0"/>
-              <a:t>3/18/17</a:t>
+              <a:t>5/13/17</a:t>
             </a:fld>
             <a:endParaRPr lang="en-US"/>
           </a:p>
@@ -2439,7 +2528,7 @@
         </p:nvSpPr>
         <p:spPr>
           <a:xfrm>
-            <a:off x="457204" y="273049"/>
+            <a:off x="457206" y="273049"/>
             <a:ext cx="3008313" cy="1162051"/>
           </a:xfrm>
         </p:spPr>
@@ -2471,7 +2560,7 @@
         </p:nvSpPr>
         <p:spPr>
           <a:xfrm>
-            <a:off x="3575050" y="273053"/>
+            <a:off x="3575050" y="273054"/>
             <a:ext cx="5111750" cy="5853113"/>
           </a:xfrm>
         </p:spPr>
@@ -2556,7 +2645,7 @@
         </p:nvSpPr>
         <p:spPr>
           <a:xfrm>
-            <a:off x="457204" y="1435103"/>
+            <a:off x="457206" y="1435104"/>
             <a:ext cx="3008313" cy="4691063"/>
           </a:xfrm>
         </p:spPr>
@@ -2626,7 +2715,7 @@
           <a:p>
             <a:fld id="{30F42486-D2A3-2447-A496-D33DD53C7227}" type="datetimeFigureOut">
               <a:rPr lang="en-US" smtClean="0"/>
-              <a:t>3/18/17</a:t>
+              <a:t>5/13/17</a:t>
             </a:fld>
             <a:endParaRPr lang="en-US"/>
           </a:p>
@@ -2809,7 +2898,7 @@
         </p:nvSpPr>
         <p:spPr>
           <a:xfrm>
-            <a:off x="1792288" y="5367339"/>
+            <a:off x="1792288" y="5367341"/>
             <a:ext cx="5486400" cy="804863"/>
           </a:xfrm>
         </p:spPr>
@@ -2879,7 +2968,7 @@
           <a:p>
             <a:fld id="{30F42486-D2A3-2447-A496-D33DD53C7227}" type="datetimeFigureOut">
               <a:rPr lang="en-US" smtClean="0"/>
-              <a:t>3/18/17</a:t>
+              <a:t>5/13/17</a:t>
             </a:fld>
             <a:endParaRPr lang="en-US"/>
           </a:p>
@@ -3092,7 +3181,7 @@
           <a:p>
             <a:fld id="{30F42486-D2A3-2447-A496-D33DD53C7227}" type="datetimeFigureOut">
               <a:rPr lang="en-US" smtClean="0"/>
-              <a:t>3/18/17</a:t>
+              <a:t>5/13/17</a:t>
             </a:fld>
             <a:endParaRPr lang="en-US"/>
           </a:p>
@@ -3502,35 +3591,6 @@
       </p:sp>
       <p:pic>
         <p:nvPicPr>
-          <p:cNvPr id="8" name="Picture 7"/>
-          <p:cNvPicPr>
-            <a:picLocks noChangeAspect="1"/>
-          </p:cNvPicPr>
-          <p:nvPr/>
-        </p:nvPicPr>
-        <p:blipFill rotWithShape="1">
-          <a:blip r:embed="rId2">
-            <a:extLst>
-              <a:ext uri="{28A0092B-C50C-407E-A947-70E740481C1C}">
-                <a14:useLocalDpi xmlns:a14="http://schemas.microsoft.com/office/drawing/2010/main" val="0"/>
-              </a:ext>
-            </a:extLst>
-          </a:blip>
-          <a:srcRect l="5103" t="12791" r="8163" b="6380"/>
-          <a:stretch/>
-        </p:blipFill>
-        <p:spPr>
-          <a:xfrm>
-            <a:off x="8079117" y="857252"/>
-            <a:ext cx="1041137" cy="1164733"/>
-          </a:xfrm>
-          <a:prstGeom prst="rect">
-            <a:avLst/>
-          </a:prstGeom>
-        </p:spPr>
-      </p:pic>
-      <p:pic>
-        <p:nvPicPr>
           <p:cNvPr id="9" name="Picture 8"/>
           <p:cNvPicPr>
             <a:picLocks noChangeAspect="1"/>
@@ -3538,7 +3598,7 @@
           <p:nvPr/>
         </p:nvPicPr>
         <p:blipFill>
-          <a:blip r:embed="rId3">
+          <a:blip r:embed="rId2">
             <a:extLst>
               <a:ext uri="{28A0092B-C50C-407E-A947-70E740481C1C}">
                 <a14:useLocalDpi xmlns:a14="http://schemas.microsoft.com/office/drawing/2010/main" val="0"/>
@@ -3828,7 +3888,7 @@
         </p:nvSpPr>
         <p:spPr>
           <a:xfrm>
-            <a:off x="1262573" y="5596529"/>
+            <a:off x="1262573" y="5596531"/>
             <a:ext cx="7113316" cy="532589"/>
           </a:xfrm>
           <a:prstGeom prst="rect">
@@ -3879,6 +3939,30 @@
           </a:p>
         </p:txBody>
       </p:sp>
+      <p:pic>
+        <p:nvPicPr>
+          <p:cNvPr id="11" name="Picture 10"/>
+          <p:cNvPicPr>
+            <a:picLocks noChangeAspect="1"/>
+          </p:cNvPicPr>
+          <p:nvPr/>
+        </p:nvPicPr>
+        <p:blipFill>
+          <a:blip r:embed="rId3"/>
+          <a:stretch>
+            <a:fillRect/>
+          </a:stretch>
+        </p:blipFill>
+        <p:spPr>
+          <a:xfrm>
+            <a:off x="7726054" y="867467"/>
+            <a:ext cx="1417946" cy="1533539"/>
+          </a:xfrm>
+          <a:prstGeom prst="rect">
+            <a:avLst/>
+          </a:prstGeom>
+        </p:spPr>
+      </p:pic>
     </p:spTree>
     <p:extLst>
       <p:ext uri="{BB962C8B-B14F-4D97-AF65-F5344CB8AC3E}">
@@ -3951,35 +4035,6 @@
       </p:sp>
       <p:pic>
         <p:nvPicPr>
-          <p:cNvPr id="8" name="Picture 7"/>
-          <p:cNvPicPr>
-            <a:picLocks noChangeAspect="1"/>
-          </p:cNvPicPr>
-          <p:nvPr/>
-        </p:nvPicPr>
-        <p:blipFill rotWithShape="1">
-          <a:blip r:embed="rId2">
-            <a:extLst>
-              <a:ext uri="{28A0092B-C50C-407E-A947-70E740481C1C}">
-                <a14:useLocalDpi xmlns:a14="http://schemas.microsoft.com/office/drawing/2010/main" val="0"/>
-              </a:ext>
-            </a:extLst>
-          </a:blip>
-          <a:srcRect l="5103" t="12791" r="8163" b="6380"/>
-          <a:stretch/>
-        </p:blipFill>
-        <p:spPr>
-          <a:xfrm>
-            <a:off x="8079117" y="857252"/>
-            <a:ext cx="1041137" cy="1164733"/>
-          </a:xfrm>
-          <a:prstGeom prst="rect">
-            <a:avLst/>
-          </a:prstGeom>
-        </p:spPr>
-      </p:pic>
-      <p:pic>
-        <p:nvPicPr>
           <p:cNvPr id="9" name="Picture 8"/>
           <p:cNvPicPr>
             <a:picLocks noChangeAspect="1"/>
@@ -3987,7 +4042,7 @@
           <p:nvPr/>
         </p:nvPicPr>
         <p:blipFill>
-          <a:blip r:embed="rId3">
+          <a:blip r:embed="rId2">
             <a:extLst>
               <a:ext uri="{28A0092B-C50C-407E-A947-70E740481C1C}">
                 <a14:useLocalDpi xmlns:a14="http://schemas.microsoft.com/office/drawing/2010/main" val="0"/>
@@ -4016,7 +4071,7 @@
         </p:nvSpPr>
         <p:spPr>
           <a:xfrm>
-            <a:off x="795647" y="1736027"/>
+            <a:off x="795647" y="1736029"/>
             <a:ext cx="7410202" cy="3598223"/>
           </a:xfrm>
           <a:prstGeom prst="rect">
@@ -4222,7 +4277,7 @@
         </p:nvSpPr>
         <p:spPr>
           <a:xfrm>
-            <a:off x="1262573" y="5596529"/>
+            <a:off x="1262573" y="5596531"/>
             <a:ext cx="7113316" cy="532589"/>
           </a:xfrm>
           <a:prstGeom prst="rect">
@@ -4250,6 +4305,30 @@
           </a:p>
         </p:txBody>
       </p:sp>
+      <p:pic>
+        <p:nvPicPr>
+          <p:cNvPr id="11" name="Picture 10"/>
+          <p:cNvPicPr>
+            <a:picLocks noChangeAspect="1"/>
+          </p:cNvPicPr>
+          <p:nvPr/>
+        </p:nvPicPr>
+        <p:blipFill>
+          <a:blip r:embed="rId3"/>
+          <a:stretch>
+            <a:fillRect/>
+          </a:stretch>
+        </p:blipFill>
+        <p:spPr>
+          <a:xfrm>
+            <a:off x="7726054" y="867467"/>
+            <a:ext cx="1417946" cy="1533539"/>
+          </a:xfrm>
+          <a:prstGeom prst="rect">
+            <a:avLst/>
+          </a:prstGeom>
+        </p:spPr>
+      </p:pic>
     </p:spTree>
     <p:extLst>
       <p:ext uri="{BB962C8B-B14F-4D97-AF65-F5344CB8AC3E}">
@@ -4346,14 +4425,14 @@
           </a:ln>
           <a:extLst>
             <a:ext uri="{909E8E84-426E-40dd-AFC4-6F175D3DCCD1}">
-              <a14:hiddenFill xmlns="" xmlns:a14="http://schemas.microsoft.com/office/drawing/2010/main">
+              <a14:hiddenFill xmlns:a14="http://schemas.microsoft.com/office/drawing/2010/main" xmlns="">
                 <a:solidFill>
                   <a:srgbClr val="FFFFFF"/>
                 </a:solidFill>
               </a14:hiddenFill>
             </a:ext>
             <a:ext uri="{91240B29-F687-4f45-9708-019B960494DF}">
-              <a14:hiddenLine xmlns="" xmlns:a14="http://schemas.microsoft.com/office/drawing/2010/main" w="9525">
+              <a14:hiddenLine xmlns:a14="http://schemas.microsoft.com/office/drawing/2010/main" xmlns="" w="9525">
                 <a:solidFill>
                   <a:srgbClr val="000000"/>
                 </a:solidFill>
@@ -4430,7 +4509,7 @@
           <a:noFill/>
           <a:extLst>
             <a:ext uri="{909E8E84-426E-40dd-AFC4-6F175D3DCCD1}">
-              <a14:hiddenFill xmlns="" xmlns:a14="http://schemas.microsoft.com/office/drawing/2010/main">
+              <a14:hiddenFill xmlns:a14="http://schemas.microsoft.com/office/drawing/2010/main" xmlns="">
                 <a:solidFill>
                   <a:srgbClr val="FFFFFF"/>
                 </a:solidFill>
@@ -4439,109 +4518,6 @@
           </a:extLst>
         </p:spPr>
       </p:pic>
-      <p:grpSp>
-        <p:nvGrpSpPr>
-          <p:cNvPr id="4" name="Group 3"/>
-          <p:cNvGrpSpPr/>
-          <p:nvPr/>
-        </p:nvGrpSpPr>
-        <p:grpSpPr>
-          <a:xfrm>
-            <a:off x="4150056" y="4724400"/>
-            <a:ext cx="914400" cy="914400"/>
-            <a:chOff x="4150056" y="5791200"/>
-            <a:chExt cx="914400" cy="914400"/>
-          </a:xfrm>
-        </p:grpSpPr>
-        <p:sp>
-          <p:nvSpPr>
-            <p:cNvPr id="2" name="Oval 1">
-              <a:hlinkClick r:id="" action="ppaction://hlinkfile"/>
-            </p:cNvPr>
-            <p:cNvSpPr/>
-            <p:nvPr/>
-          </p:nvSpPr>
-          <p:spPr>
-            <a:xfrm>
-              <a:off x="4150056" y="5791200"/>
-              <a:ext cx="914400" cy="914400"/>
-            </a:xfrm>
-            <a:prstGeom prst="ellipse">
-              <a:avLst/>
-            </a:prstGeom>
-            <a:solidFill>
-              <a:srgbClr val="DE7146"/>
-            </a:solidFill>
-            <a:ln>
-              <a:noFill/>
-            </a:ln>
-          </p:spPr>
-          <p:style>
-            <a:lnRef idx="2">
-              <a:schemeClr val="accent1">
-                <a:shade val="50000"/>
-              </a:schemeClr>
-            </a:lnRef>
-            <a:fillRef idx="1">
-              <a:schemeClr val="accent1"/>
-            </a:fillRef>
-            <a:effectRef idx="0">
-              <a:schemeClr val="accent1"/>
-            </a:effectRef>
-            <a:fontRef idx="minor">
-              <a:schemeClr val="lt1"/>
-            </a:fontRef>
-          </p:style>
-          <p:txBody>
-            <a:bodyPr rtlCol="0" anchor="ctr"/>
-            <a:lstStyle/>
-            <a:p>
-              <a:pPr algn="ctr"/>
-              <a:endParaRPr lang="en-US" sz="2000" b="1" dirty="0">
-                <a:cs typeface="Aparajita" panose="020B0604020202020204" pitchFamily="34" charset="0"/>
-              </a:endParaRPr>
-            </a:p>
-          </p:txBody>
-        </p:sp>
-        <p:sp>
-          <p:nvSpPr>
-            <p:cNvPr id="3" name="Rectangle 2"/>
-            <p:cNvSpPr/>
-            <p:nvPr/>
-          </p:nvSpPr>
-          <p:spPr>
-            <a:xfrm>
-              <a:off x="4341957" y="6039428"/>
-              <a:ext cx="676788" cy="523220"/>
-            </a:xfrm>
-            <a:prstGeom prst="rect">
-              <a:avLst/>
-            </a:prstGeom>
-          </p:spPr>
-          <p:txBody>
-            <a:bodyPr wrap="none">
-              <a:spAutoFit/>
-            </a:bodyPr>
-            <a:lstStyle/>
-            <a:p>
-              <a:pPr algn="ctr"/>
-              <a:r>
-                <a:rPr lang="gu-IN" sz="2800" b="1" dirty="0">
-                  <a:solidFill>
-                    <a:srgbClr val="FF0000"/>
-                  </a:solidFill>
-                </a:rPr>
-                <a:t>ૐ </a:t>
-              </a:r>
-              <a:endParaRPr lang="en-US" sz="2800" b="1" dirty="0">
-                <a:solidFill>
-                  <a:srgbClr val="FF0000"/>
-                </a:solidFill>
-              </a:endParaRPr>
-            </a:p>
-          </p:txBody>
-        </p:sp>
-      </p:grpSp>
       <p:sp>
         <p:nvSpPr>
           <p:cNvPr id="8" name="TextBox 7"/>
@@ -4550,7 +4526,7 @@
         </p:nvSpPr>
         <p:spPr>
           <a:xfrm>
-            <a:off x="3178167" y="6877051"/>
+            <a:off x="3109718" y="5536067"/>
             <a:ext cx="2981714" cy="584775"/>
           </a:xfrm>
           <a:prstGeom prst="rect">
@@ -4572,6 +4548,64 @@
                 </a:solidFill>
               </a:rPr>
               <a:t>Silent Departure</a:t>
+            </a:r>
+          </a:p>
+        </p:txBody>
+      </p:sp>
+      <p:sp>
+        <p:nvSpPr>
+          <p:cNvPr id="9" name="Title 1"/>
+          <p:cNvSpPr txBox="1">
+            <a:spLocks/>
+          </p:cNvSpPr>
+          <p:nvPr/>
+        </p:nvSpPr>
+        <p:spPr>
+          <a:xfrm>
+            <a:off x="2772833" y="457200"/>
+            <a:ext cx="3886200" cy="609600"/>
+          </a:xfrm>
+          <a:prstGeom prst="rect">
+            <a:avLst/>
+          </a:prstGeom>
+          <a:ln w="28575">
+            <a:noFill/>
+          </a:ln>
+        </p:spPr>
+        <p:txBody>
+          <a:bodyPr vert="horz" lIns="91440" tIns="45720" rIns="91440" bIns="45720" rtlCol="0" anchor="ctr">
+            <a:normAutofit/>
+          </a:bodyPr>
+          <a:lstStyle>
+            <a:lvl1pPr algn="ctr" defTabSz="457200" rtl="0" eaLnBrk="1" latinLnBrk="0" hangingPunct="1">
+              <a:spcBef>
+                <a:spcPct val="0"/>
+              </a:spcBef>
+              <a:buNone/>
+              <a:defRPr sz="4400" kern="1200">
+                <a:solidFill>
+                  <a:schemeClr val="tx1"/>
+                </a:solidFill>
+                <a:latin typeface="+mj-lt"/>
+                <a:ea typeface="+mj-ea"/>
+                <a:cs typeface="+mj-cs"/>
+              </a:defRPr>
+            </a:lvl1pPr>
+          </a:lstStyle>
+          <a:p>
+            <a:pPr>
+              <a:defRPr/>
+            </a:pPr>
+            <a:r>
+              <a:rPr lang="en-US" sz="3200" b="1" dirty="0">
+                <a:solidFill>
+                  <a:schemeClr val="bg1"/>
+                </a:solidFill>
+                <a:latin typeface="+mn-lt"/>
+                <a:ea typeface="ＭＳ Ｐゴシック" charset="0"/>
+                <a:cs typeface="ＭＳ Ｐゴシック" charset="0"/>
+              </a:rPr>
+              <a:t>Meditation</a:t>
             </a:r>
           </a:p>
         </p:txBody>
@@ -4947,7 +4981,7 @@
           <p:nvPr/>
         </p:nvPicPr>
         <p:blipFill>
-          <a:blip r:embed="rId2" cstate="print">
+          <a:blip r:embed="rId3" cstate="print">
             <a:extLst>
               <a:ext uri="{28A0092B-C50C-407E-A947-70E740481C1C}">
                 <a14:useLocalDpi xmlns:a14="http://schemas.microsoft.com/office/drawing/2010/main" val="0"/>
@@ -4961,8 +4995,8 @@
         </p:blipFill>
         <p:spPr bwMode="auto">
           <a:xfrm>
-            <a:off x="0" y="-3175"/>
-            <a:ext cx="9144000" cy="6869113"/>
+            <a:off x="0" y="567267"/>
+            <a:ext cx="9144000" cy="5579533"/>
           </a:xfrm>
           <a:prstGeom prst="rect">
             <a:avLst/>
@@ -4973,14 +5007,14 @@
           </a:ln>
           <a:extLst>
             <a:ext uri="{909E8E84-426E-40dd-AFC4-6F175D3DCCD1}">
-              <a14:hiddenFill xmlns="" xmlns:a14="http://schemas.microsoft.com/office/drawing/2010/main">
+              <a14:hiddenFill xmlns:a14="http://schemas.microsoft.com/office/drawing/2010/main" xmlns="">
                 <a:solidFill>
                   <a:srgbClr val="FFFFFF"/>
                 </a:solidFill>
               </a14:hiddenFill>
             </a:ext>
             <a:ext uri="{91240B29-F687-4f45-9708-019B960494DF}">
-              <a14:hiddenLine xmlns="" xmlns:a14="http://schemas.microsoft.com/office/drawing/2010/main" w="9525">
+              <a14:hiddenLine xmlns:a14="http://schemas.microsoft.com/office/drawing/2010/main" xmlns="" w="9525">
                 <a:solidFill>
                   <a:srgbClr val="000000"/>
                 </a:solidFill>
@@ -5002,7 +5036,7 @@
         </p:nvSpPr>
         <p:spPr bwMode="auto">
           <a:xfrm>
-            <a:off x="152400" y="5791203"/>
+            <a:off x="152400" y="5122338"/>
             <a:ext cx="8839200" cy="584775"/>
           </a:xfrm>
           <a:prstGeom prst="rect">
@@ -5014,14 +5048,14 @@
           </a:ln>
           <a:extLst>
             <a:ext uri="{909E8E84-426E-40dd-AFC4-6F175D3DCCD1}">
-              <a14:hiddenFill xmlns="" xmlns:a14="http://schemas.microsoft.com/office/drawing/2010/main">
+              <a14:hiddenFill xmlns:a14="http://schemas.microsoft.com/office/drawing/2010/main" xmlns="">
                 <a:solidFill>
                   <a:srgbClr val="FFFFFF"/>
                 </a:solidFill>
               </a14:hiddenFill>
             </a:ext>
             <a:ext uri="{91240B29-F687-4f45-9708-019B960494DF}">
-              <a14:hiddenLine xmlns="" xmlns:a14="http://schemas.microsoft.com/office/drawing/2010/main" w="9525">
+              <a14:hiddenLine xmlns:a14="http://schemas.microsoft.com/office/drawing/2010/main" xmlns="" w="9525">
                 <a:solidFill>
                   <a:srgbClr val="000000"/>
                 </a:solidFill>

</xml_diff>